<commit_message>
Detalhes Finais, Trabalho Concluido
</commit_message>
<xml_diff>
--- a/Apresentação/Arquitetura de Computadores2.pptx
+++ b/Apresentação/Arquitetura de Computadores2.pptx
@@ -5,15 +5,19 @@
     <p:sldMasterId id="2147483648" r:id="rId1"/>
   </p:sldMasterIdLst>
   <p:notesMasterIdLst>
-    <p:notesMasterId r:id="rId9"/>
+    <p:notesMasterId r:id="rId12"/>
   </p:notesMasterIdLst>
   <p:sldIdLst>
-    <p:sldId id="257" r:id="rId3"/>
-    <p:sldId id="258" r:id="rId4"/>
-    <p:sldId id="259" r:id="rId5"/>
-    <p:sldId id="262" r:id="rId6"/>
-    <p:sldId id="260" r:id="rId7"/>
-    <p:sldId id="261" r:id="rId8"/>
+    <p:sldId id="257" r:id="rId2"/>
+    <p:sldId id="258" r:id="rId3"/>
+    <p:sldId id="259" r:id="rId4"/>
+    <p:sldId id="262" r:id="rId5"/>
+    <p:sldId id="263" r:id="rId6"/>
+    <p:sldId id="264" r:id="rId7"/>
+    <p:sldId id="265" r:id="rId8"/>
+    <p:sldId id="266" r:id="rId9"/>
+    <p:sldId id="260" r:id="rId10"/>
+    <p:sldId id="261" r:id="rId11"/>
   </p:sldIdLst>
   <p:sldSz cx="12192000" cy="6858000"/>
   <p:notesSz cx="6858000" cy="9144000"/>
@@ -112,6 +116,14 @@
       </a:defRPr>
     </a:lvl9pPr>
   </p:defaultTextStyle>
+  <p:extLst>
+    <p:ext uri="{EFAFB233-063F-42B5-8137-9DF3F51BA10A}">
+      <p15:sldGuideLst xmlns:p15="http://schemas.microsoft.com/office/powerpoint/2012/main"/>
+    </p:ext>
+    <p:ext uri="{2D200454-40CA-4A62-9FC3-DE9A4176ACB9}">
+      <p15:notesGuideLst xmlns:p15="http://schemas.microsoft.com/office/powerpoint/2012/main"/>
+    </p:ext>
+  </p:extLst>
 </p:presentation>
 </file>
 
@@ -197,6 +209,7 @@
           <a:p>
             <a:fld id="{6C70B395-2DD1-4E0C-AD7F-C33E717CE14B}" type="datetimeFigureOut">
               <a:rPr lang="pt-BR" smtClean="0"/>
+              <a:t>09/03/2017</a:t>
             </a:fld>
             <a:endParaRPr lang="pt-BR"/>
           </a:p>
@@ -263,7 +276,6 @@
               <a:rPr lang="pt-BR" smtClean="0"/>
               <a:t>Editar estilos de texto Mestre</a:t>
             </a:r>
-            <a:endParaRPr lang="pt-BR" smtClean="0"/>
           </a:p>
           <a:p>
             <a:pPr lvl="1"/>
@@ -271,7 +283,6 @@
               <a:rPr lang="pt-BR" smtClean="0"/>
               <a:t>Segundo nível</a:t>
             </a:r>
-            <a:endParaRPr lang="pt-BR" smtClean="0"/>
           </a:p>
           <a:p>
             <a:pPr lvl="2"/>
@@ -279,7 +290,6 @@
               <a:rPr lang="pt-BR" smtClean="0"/>
               <a:t>Terceiro nível</a:t>
             </a:r>
-            <a:endParaRPr lang="pt-BR" smtClean="0"/>
           </a:p>
           <a:p>
             <a:pPr lvl="3"/>
@@ -287,7 +297,6 @@
               <a:rPr lang="pt-BR" smtClean="0"/>
               <a:t>Quarto nível</a:t>
             </a:r>
-            <a:endParaRPr lang="pt-BR" smtClean="0"/>
           </a:p>
           <a:p>
             <a:pPr lvl="4"/>
@@ -359,12 +368,18 @@
           <a:p>
             <a:fld id="{A6666332-D461-43D9-A1C1-8FF0295CCEC5}" type="slidenum">
               <a:rPr lang="pt-BR" smtClean="0"/>
+              <a:t>‹nº›</a:t>
             </a:fld>
             <a:endParaRPr lang="pt-BR"/>
           </a:p>
         </p:txBody>
       </p:sp>
     </p:spTree>
+    <p:extLst>
+      <p:ext uri="{BB962C8B-B14F-4D97-AF65-F5344CB8AC3E}">
+        <p14:creationId xmlns:p14="http://schemas.microsoft.com/office/powerpoint/2010/main" val="1084510399"/>
+      </p:ext>
+    </p:extLst>
   </p:cSld>
   <p:clrMap bg1="lt1" tx1="dk1" bg2="lt2" tx2="dk2" accent1="accent1" accent2="accent2" accent3="accent3" accent4="accent4" accent5="accent5" accent6="accent6" hlink="hlink" folHlink="folHlink"/>
   <p:notesStyle>
@@ -593,6 +608,7 @@
           <a:p>
             <a:fld id="{AC89BC54-1CDC-4473-9720-F58E1E464D2A}" type="datetimeFigureOut">
               <a:rPr lang="pt-BR" smtClean="0"/>
+              <a:t>09/03/2017</a:t>
             </a:fld>
             <a:endParaRPr lang="pt-BR"/>
           </a:p>
@@ -634,6 +650,7 @@
           <a:p>
             <a:fld id="{E3682030-28A4-485C-A222-4952DDFF562A}" type="slidenum">
               <a:rPr lang="pt-BR" smtClean="0"/>
+              <a:t>‹nº›</a:t>
             </a:fld>
             <a:endParaRPr lang="pt-BR"/>
           </a:p>
@@ -690,7 +707,6 @@
               <a:rPr lang="pt-BR" smtClean="0"/>
               <a:t>Editar estilos de texto Mestre</a:t>
             </a:r>
-            <a:endParaRPr lang="pt-BR" smtClean="0"/>
           </a:p>
           <a:p>
             <a:pPr lvl="1"/>
@@ -698,7 +714,6 @@
               <a:rPr lang="pt-BR" smtClean="0"/>
               <a:t>Segundo nível</a:t>
             </a:r>
-            <a:endParaRPr lang="pt-BR" smtClean="0"/>
           </a:p>
           <a:p>
             <a:pPr lvl="2"/>
@@ -706,7 +721,6 @@
               <a:rPr lang="pt-BR" smtClean="0"/>
               <a:t>Terceiro nível</a:t>
             </a:r>
-            <a:endParaRPr lang="pt-BR" smtClean="0"/>
           </a:p>
           <a:p>
             <a:pPr lvl="3"/>
@@ -714,7 +728,6 @@
               <a:rPr lang="pt-BR" smtClean="0"/>
               <a:t>Quarto nível</a:t>
             </a:r>
-            <a:endParaRPr lang="pt-BR" smtClean="0"/>
           </a:p>
           <a:p>
             <a:pPr lvl="4"/>
@@ -743,6 +756,7 @@
           <a:p>
             <a:fld id="{AC89BC54-1CDC-4473-9720-F58E1E464D2A}" type="datetimeFigureOut">
               <a:rPr lang="pt-BR" smtClean="0"/>
+              <a:t>09/03/2017</a:t>
             </a:fld>
             <a:endParaRPr lang="pt-BR"/>
           </a:p>
@@ -784,6 +798,7 @@
           <a:p>
             <a:fld id="{E3682030-28A4-485C-A222-4952DDFF562A}" type="slidenum">
               <a:rPr lang="pt-BR" smtClean="0"/>
+              <a:t>‹nº›</a:t>
             </a:fld>
             <a:endParaRPr lang="pt-BR"/>
           </a:p>
@@ -858,7 +873,6 @@
               <a:rPr lang="pt-BR" smtClean="0"/>
               <a:t>Editar estilos de texto Mestre</a:t>
             </a:r>
-            <a:endParaRPr lang="pt-BR" smtClean="0"/>
           </a:p>
           <a:p>
             <a:pPr lvl="1"/>
@@ -866,7 +880,6 @@
               <a:rPr lang="pt-BR" smtClean="0"/>
               <a:t>Segundo nível</a:t>
             </a:r>
-            <a:endParaRPr lang="pt-BR" smtClean="0"/>
           </a:p>
           <a:p>
             <a:pPr lvl="2"/>
@@ -874,7 +887,6 @@
               <a:rPr lang="pt-BR" smtClean="0"/>
               <a:t>Terceiro nível</a:t>
             </a:r>
-            <a:endParaRPr lang="pt-BR" smtClean="0"/>
           </a:p>
           <a:p>
             <a:pPr lvl="3"/>
@@ -882,7 +894,6 @@
               <a:rPr lang="pt-BR" smtClean="0"/>
               <a:t>Quarto nível</a:t>
             </a:r>
-            <a:endParaRPr lang="pt-BR" smtClean="0"/>
           </a:p>
           <a:p>
             <a:pPr lvl="4"/>
@@ -911,6 +922,7 @@
           <a:p>
             <a:fld id="{AC89BC54-1CDC-4473-9720-F58E1E464D2A}" type="datetimeFigureOut">
               <a:rPr lang="pt-BR" smtClean="0"/>
+              <a:t>09/03/2017</a:t>
             </a:fld>
             <a:endParaRPr lang="pt-BR"/>
           </a:p>
@@ -952,6 +964,7 @@
           <a:p>
             <a:fld id="{E3682030-28A4-485C-A222-4952DDFF562A}" type="slidenum">
               <a:rPr lang="pt-BR" smtClean="0"/>
+              <a:t>‹nº›</a:t>
             </a:fld>
             <a:endParaRPr lang="pt-BR"/>
           </a:p>
@@ -1131,7 +1144,6 @@
               <a:rPr lang="pt-BR" smtClean="0"/>
               <a:t>Editar estilos de texto Mestre</a:t>
             </a:r>
-            <a:endParaRPr lang="pt-BR" smtClean="0"/>
           </a:p>
         </p:txBody>
       </p:sp>
@@ -1152,6 +1164,7 @@
           <a:p>
             <a:fld id="{AC89BC54-1CDC-4473-9720-F58E1E464D2A}" type="datetimeFigureOut">
               <a:rPr lang="pt-BR" smtClean="0"/>
+              <a:t>09/03/2017</a:t>
             </a:fld>
             <a:endParaRPr lang="pt-BR"/>
           </a:p>
@@ -1193,6 +1206,7 @@
           <a:p>
             <a:fld id="{E3682030-28A4-485C-A222-4952DDFF562A}" type="slidenum">
               <a:rPr lang="pt-BR" smtClean="0"/>
+              <a:t>‹nº›</a:t>
             </a:fld>
             <a:endParaRPr lang="pt-BR"/>
           </a:p>
@@ -1272,7 +1286,6 @@
               <a:rPr lang="pt-BR" smtClean="0"/>
               <a:t>Editar estilos de texto Mestre</a:t>
             </a:r>
-            <a:endParaRPr lang="pt-BR" smtClean="0"/>
           </a:p>
           <a:p>
             <a:pPr lvl="1"/>
@@ -1280,7 +1293,6 @@
               <a:rPr lang="pt-BR" smtClean="0"/>
               <a:t>Segundo nível</a:t>
             </a:r>
-            <a:endParaRPr lang="pt-BR" smtClean="0"/>
           </a:p>
           <a:p>
             <a:pPr lvl="2"/>
@@ -1288,7 +1300,6 @@
               <a:rPr lang="pt-BR" smtClean="0"/>
               <a:t>Terceiro nível</a:t>
             </a:r>
-            <a:endParaRPr lang="pt-BR" smtClean="0"/>
           </a:p>
           <a:p>
             <a:pPr lvl="3"/>
@@ -1296,7 +1307,6 @@
               <a:rPr lang="pt-BR" smtClean="0"/>
               <a:t>Quarto nível</a:t>
             </a:r>
-            <a:endParaRPr lang="pt-BR" smtClean="0"/>
           </a:p>
           <a:p>
             <a:pPr lvl="4"/>
@@ -1333,7 +1343,6 @@
               <a:rPr lang="pt-BR" smtClean="0"/>
               <a:t>Editar estilos de texto Mestre</a:t>
             </a:r>
-            <a:endParaRPr lang="pt-BR" smtClean="0"/>
           </a:p>
           <a:p>
             <a:pPr lvl="1"/>
@@ -1341,7 +1350,6 @@
               <a:rPr lang="pt-BR" smtClean="0"/>
               <a:t>Segundo nível</a:t>
             </a:r>
-            <a:endParaRPr lang="pt-BR" smtClean="0"/>
           </a:p>
           <a:p>
             <a:pPr lvl="2"/>
@@ -1349,7 +1357,6 @@
               <a:rPr lang="pt-BR" smtClean="0"/>
               <a:t>Terceiro nível</a:t>
             </a:r>
-            <a:endParaRPr lang="pt-BR" smtClean="0"/>
           </a:p>
           <a:p>
             <a:pPr lvl="3"/>
@@ -1357,7 +1364,6 @@
               <a:rPr lang="pt-BR" smtClean="0"/>
               <a:t>Quarto nível</a:t>
             </a:r>
-            <a:endParaRPr lang="pt-BR" smtClean="0"/>
           </a:p>
           <a:p>
             <a:pPr lvl="4"/>
@@ -1386,6 +1392,7 @@
           <a:p>
             <a:fld id="{AC89BC54-1CDC-4473-9720-F58E1E464D2A}" type="datetimeFigureOut">
               <a:rPr lang="pt-BR" smtClean="0"/>
+              <a:t>09/03/2017</a:t>
             </a:fld>
             <a:endParaRPr lang="pt-BR"/>
           </a:p>
@@ -1427,6 +1434,7 @@
           <a:p>
             <a:fld id="{E3682030-28A4-485C-A222-4952DDFF562A}" type="slidenum">
               <a:rPr lang="pt-BR" smtClean="0"/>
+              <a:t>‹nº›</a:t>
             </a:fld>
             <a:endParaRPr lang="pt-BR"/>
           </a:p>
@@ -1548,7 +1556,6 @@
               <a:rPr lang="pt-BR" smtClean="0"/>
               <a:t>Editar estilos de texto Mestre</a:t>
             </a:r>
-            <a:endParaRPr lang="pt-BR" smtClean="0"/>
           </a:p>
         </p:txBody>
       </p:sp>
@@ -1577,7 +1584,6 @@
               <a:rPr lang="pt-BR" smtClean="0"/>
               <a:t>Editar estilos de texto Mestre</a:t>
             </a:r>
-            <a:endParaRPr lang="pt-BR" smtClean="0"/>
           </a:p>
           <a:p>
             <a:pPr lvl="1"/>
@@ -1585,7 +1591,6 @@
               <a:rPr lang="pt-BR" smtClean="0"/>
               <a:t>Segundo nível</a:t>
             </a:r>
-            <a:endParaRPr lang="pt-BR" smtClean="0"/>
           </a:p>
           <a:p>
             <a:pPr lvl="2"/>
@@ -1593,7 +1598,6 @@
               <a:rPr lang="pt-BR" smtClean="0"/>
               <a:t>Terceiro nível</a:t>
             </a:r>
-            <a:endParaRPr lang="pt-BR" smtClean="0"/>
           </a:p>
           <a:p>
             <a:pPr lvl="3"/>
@@ -1601,7 +1605,6 @@
               <a:rPr lang="pt-BR" smtClean="0"/>
               <a:t>Quarto nível</a:t>
             </a:r>
-            <a:endParaRPr lang="pt-BR" smtClean="0"/>
           </a:p>
           <a:p>
             <a:pPr lvl="4"/>
@@ -1675,7 +1678,6 @@
               <a:rPr lang="pt-BR" smtClean="0"/>
               <a:t>Editar estilos de texto Mestre</a:t>
             </a:r>
-            <a:endParaRPr lang="pt-BR" smtClean="0"/>
           </a:p>
         </p:txBody>
       </p:sp>
@@ -1704,7 +1706,6 @@
               <a:rPr lang="pt-BR" smtClean="0"/>
               <a:t>Editar estilos de texto Mestre</a:t>
             </a:r>
-            <a:endParaRPr lang="pt-BR" smtClean="0"/>
           </a:p>
           <a:p>
             <a:pPr lvl="1"/>
@@ -1712,7 +1713,6 @@
               <a:rPr lang="pt-BR" smtClean="0"/>
               <a:t>Segundo nível</a:t>
             </a:r>
-            <a:endParaRPr lang="pt-BR" smtClean="0"/>
           </a:p>
           <a:p>
             <a:pPr lvl="2"/>
@@ -1720,7 +1720,6 @@
               <a:rPr lang="pt-BR" smtClean="0"/>
               <a:t>Terceiro nível</a:t>
             </a:r>
-            <a:endParaRPr lang="pt-BR" smtClean="0"/>
           </a:p>
           <a:p>
             <a:pPr lvl="3"/>
@@ -1728,7 +1727,6 @@
               <a:rPr lang="pt-BR" smtClean="0"/>
               <a:t>Quarto nível</a:t>
             </a:r>
-            <a:endParaRPr lang="pt-BR" smtClean="0"/>
           </a:p>
           <a:p>
             <a:pPr lvl="4"/>
@@ -1757,6 +1755,7 @@
           <a:p>
             <a:fld id="{AC89BC54-1CDC-4473-9720-F58E1E464D2A}" type="datetimeFigureOut">
               <a:rPr lang="pt-BR" smtClean="0"/>
+              <a:t>09/03/2017</a:t>
             </a:fld>
             <a:endParaRPr lang="pt-BR"/>
           </a:p>
@@ -1798,6 +1797,7 @@
           <a:p>
             <a:fld id="{E3682030-28A4-485C-A222-4952DDFF562A}" type="slidenum">
               <a:rPr lang="pt-BR" smtClean="0"/>
+              <a:t>‹nº›</a:t>
             </a:fld>
             <a:endParaRPr lang="pt-BR"/>
           </a:p>
@@ -1869,6 +1869,7 @@
           <a:p>
             <a:fld id="{AC89BC54-1CDC-4473-9720-F58E1E464D2A}" type="datetimeFigureOut">
               <a:rPr lang="pt-BR" smtClean="0"/>
+              <a:t>09/03/2017</a:t>
             </a:fld>
             <a:endParaRPr lang="pt-BR"/>
           </a:p>
@@ -1910,6 +1911,7 @@
           <a:p>
             <a:fld id="{E3682030-28A4-485C-A222-4952DDFF562A}" type="slidenum">
               <a:rPr lang="pt-BR" smtClean="0"/>
+              <a:t>‹nº›</a:t>
             </a:fld>
             <a:endParaRPr lang="pt-BR"/>
           </a:p>
@@ -1958,6 +1960,7 @@
           <a:p>
             <a:fld id="{AC89BC54-1CDC-4473-9720-F58E1E464D2A}" type="datetimeFigureOut">
               <a:rPr lang="pt-BR" smtClean="0"/>
+              <a:t>09/03/2017</a:t>
             </a:fld>
             <a:endParaRPr lang="pt-BR"/>
           </a:p>
@@ -1999,6 +2002,7 @@
           <a:p>
             <a:fld id="{E3682030-28A4-485C-A222-4952DDFF562A}" type="slidenum">
               <a:rPr lang="pt-BR" smtClean="0"/>
+              <a:t>‹nº›</a:t>
             </a:fld>
             <a:endParaRPr lang="pt-BR"/>
           </a:p>
@@ -2185,7 +2189,6 @@
               <a:rPr lang="pt-BR" smtClean="0"/>
               <a:t>Editar estilos de texto Mestre</a:t>
             </a:r>
-            <a:endParaRPr lang="pt-BR" smtClean="0"/>
           </a:p>
         </p:txBody>
       </p:sp>
@@ -2206,6 +2209,7 @@
           <a:p>
             <a:fld id="{AC89BC54-1CDC-4473-9720-F58E1E464D2A}" type="datetimeFigureOut">
               <a:rPr lang="pt-BR" smtClean="0"/>
+              <a:t>09/03/2017</a:t>
             </a:fld>
             <a:endParaRPr lang="pt-BR"/>
           </a:p>
@@ -2247,6 +2251,7 @@
           <a:p>
             <a:fld id="{E3682030-28A4-485C-A222-4952DDFF562A}" type="slidenum">
               <a:rPr lang="pt-BR" smtClean="0"/>
+              <a:t>‹nº›</a:t>
             </a:fld>
             <a:endParaRPr lang="pt-BR"/>
           </a:p>
@@ -2331,7 +2336,6 @@
               <a:rPr lang="pt-BR" smtClean="0"/>
               <a:t>Editar estilos de texto Mestre</a:t>
             </a:r>
-            <a:endParaRPr lang="pt-BR" smtClean="0"/>
           </a:p>
           <a:p>
             <a:pPr lvl="1"/>
@@ -2339,7 +2343,6 @@
               <a:rPr lang="pt-BR" smtClean="0"/>
               <a:t>Segundo nível</a:t>
             </a:r>
-            <a:endParaRPr lang="pt-BR" smtClean="0"/>
           </a:p>
           <a:p>
             <a:pPr lvl="2"/>
@@ -2347,7 +2350,6 @@
               <a:rPr lang="pt-BR" smtClean="0"/>
               <a:t>Terceiro nível</a:t>
             </a:r>
-            <a:endParaRPr lang="pt-BR" smtClean="0"/>
           </a:p>
           <a:p>
             <a:pPr lvl="3"/>
@@ -2355,7 +2357,6 @@
               <a:rPr lang="pt-BR" smtClean="0"/>
               <a:t>Quarto nível</a:t>
             </a:r>
-            <a:endParaRPr lang="pt-BR" smtClean="0"/>
           </a:p>
           <a:p>
             <a:pPr lvl="4"/>
@@ -2384,6 +2385,7 @@
           <a:p>
             <a:fld id="{AC89BC54-1CDC-4473-9720-F58E1E464D2A}" type="datetimeFigureOut">
               <a:rPr lang="pt-BR" smtClean="0"/>
+              <a:t>09/03/2017</a:t>
             </a:fld>
             <a:endParaRPr lang="pt-BR"/>
           </a:p>
@@ -2425,6 +2427,7 @@
           <a:p>
             <a:fld id="{E3682030-28A4-485C-A222-4952DDFF562A}" type="slidenum">
               <a:rPr lang="pt-BR" smtClean="0"/>
+              <a:t>‹nº›</a:t>
             </a:fld>
             <a:endParaRPr lang="pt-BR"/>
           </a:p>
@@ -2524,7 +2527,6 @@
               <a:rPr lang="pt-BR" smtClean="0"/>
               <a:t>Editar estilos de texto Mestre</a:t>
             </a:r>
-            <a:endParaRPr lang="pt-BR" smtClean="0"/>
           </a:p>
           <a:p>
             <a:pPr lvl="1"/>
@@ -2532,7 +2534,6 @@
               <a:rPr lang="pt-BR" smtClean="0"/>
               <a:t>Segundo nível</a:t>
             </a:r>
-            <a:endParaRPr lang="pt-BR" smtClean="0"/>
           </a:p>
           <a:p>
             <a:pPr lvl="2"/>
@@ -2540,7 +2541,6 @@
               <a:rPr lang="pt-BR" smtClean="0"/>
               <a:t>Terceiro nível</a:t>
             </a:r>
-            <a:endParaRPr lang="pt-BR" smtClean="0"/>
           </a:p>
           <a:p>
             <a:pPr lvl="3"/>
@@ -2548,7 +2548,6 @@
               <a:rPr lang="pt-BR" smtClean="0"/>
               <a:t>Quarto nível</a:t>
             </a:r>
-            <a:endParaRPr lang="pt-BR" smtClean="0"/>
           </a:p>
           <a:p>
             <a:pPr lvl="4"/>
@@ -2595,6 +2594,7 @@
           <a:p>
             <a:fld id="{AC89BC54-1CDC-4473-9720-F58E1E464D2A}" type="datetimeFigureOut">
               <a:rPr lang="pt-BR" smtClean="0"/>
+              <a:t>09/03/2017</a:t>
             </a:fld>
             <a:endParaRPr lang="pt-BR"/>
           </a:p>
@@ -2672,6 +2672,7 @@
           <a:p>
             <a:fld id="{E3682030-28A4-485C-A222-4952DDFF562A}" type="slidenum">
               <a:rPr lang="pt-BR" smtClean="0"/>
+              <a:t>‹nº›</a:t>
             </a:fld>
             <a:endParaRPr lang="pt-BR"/>
           </a:p>
@@ -2985,7 +2986,14 @@
         <p:cNvGrpSpPr/>
         <p:nvPr/>
       </p:nvGrpSpPr>
-      <p:grpSpPr/>
+      <p:grpSpPr>
+        <a:xfrm>
+          <a:off x="0" y="0"/>
+          <a:ext cx="0" cy="0"/>
+          <a:chOff x="0" y="0"/>
+          <a:chExt cx="0" cy="0"/>
+        </a:xfrm>
+      </p:grpSpPr>
       <p:sp>
         <p:nvSpPr>
           <p:cNvPr id="2" name="Título 1"/>
@@ -3003,18 +3011,57 @@
           </a:xfrm>
         </p:spPr>
         <p:txBody>
-          <a:bodyPr/>
-          <a:p>
-            <a:r>
-              <a:rPr lang="pt-BR" altLang="en-US" sz="4400">
+          <a:bodyPr>
+            <a:normAutofit/>
+          </a:bodyPr>
+          <a:lstStyle/>
+          <a:p>
+            <a:r>
+              <a:rPr lang="pt-BR" altLang="en-US" sz="4400" dirty="0">
                 <a:solidFill>
                   <a:schemeClr val="tx1"/>
                 </a:solidFill>
                 <a:uFillTx/>
               </a:rPr>
-              <a:t>Arquitetura de Computadores</a:t>
-            </a:r>
-            <a:endParaRPr lang="pt-BR" altLang="en-US" sz="4400">
+              <a:t>Arquitetura de </a:t>
+            </a:r>
+            <a:r>
+              <a:rPr lang="pt-BR" altLang="en-US" sz="4400" dirty="0" smtClean="0">
+                <a:solidFill>
+                  <a:schemeClr val="tx1"/>
+                </a:solidFill>
+                <a:uFillTx/>
+              </a:rPr>
+              <a:t>Computadores</a:t>
+            </a:r>
+            <a:br>
+              <a:rPr lang="pt-BR" altLang="en-US" sz="4400" dirty="0" smtClean="0">
+                <a:solidFill>
+                  <a:schemeClr val="tx1"/>
+                </a:solidFill>
+                <a:uFillTx/>
+              </a:rPr>
+            </a:br>
+            <a:r>
+              <a:rPr lang="pt-BR" altLang="en-US" sz="4400" dirty="0"/>
+              <a:t/>
+            </a:r>
+            <a:br>
+              <a:rPr lang="pt-BR" altLang="en-US" sz="4400" dirty="0"/>
+            </a:br>
+            <a:r>
+              <a:rPr lang="pt-BR" altLang="en-US" sz="4400" dirty="0" err="1" smtClean="0"/>
+              <a:t>Sleep</a:t>
+            </a:r>
+            <a:r>
+              <a:rPr lang="pt-BR" altLang="en-US" sz="4400" dirty="0" smtClean="0"/>
+              <a:t> </a:t>
+            </a:r>
+            <a:r>
+              <a:rPr lang="pt-BR" altLang="en-US" sz="4400" dirty="0" err="1" smtClean="0"/>
+              <a:t>Mode</a:t>
+            </a:r>
+            <a:endParaRPr lang="pt-BR" altLang="en-US" sz="4400" dirty="0">
               <a:solidFill>
                 <a:schemeClr val="tx1"/>
               </a:solidFill>
@@ -3041,27 +3088,25 @@
         </p:spPr>
         <p:txBody>
           <a:bodyPr/>
+          <a:lstStyle/>
           <a:p>
             <a:pPr algn="ctr"/>
             <a:r>
               <a:rPr lang="pt-BR" altLang="en-US"/>
               <a:t>Pablo Silva</a:t>
             </a:r>
-            <a:endParaRPr lang="pt-BR" altLang="en-US"/>
           </a:p>
           <a:p>
             <a:r>
               <a:rPr lang="pt-BR" altLang="en-US"/>
               <a:t>Marco Túlio</a:t>
             </a:r>
-            <a:endParaRPr lang="pt-BR" altLang="en-US"/>
           </a:p>
           <a:p>
             <a:r>
               <a:rPr lang="pt-BR" altLang="en-US"/>
               <a:t>Vitor do Vale</a:t>
             </a:r>
-            <a:endParaRPr lang="pt-BR" altLang="en-US"/>
           </a:p>
         </p:txBody>
       </p:sp>
@@ -3078,9 +3123,114 @@
         <p:spPr/>
         <p:txBody>
           <a:bodyPr/>
+          <a:lstStyle/>
           <a:p>
             <a:fld id="{E3682030-28A4-485C-A222-4952DDFF562A}" type="slidenum">
               <a:rPr lang="pt-BR" smtClean="0"/>
+              <a:t>1</a:t>
+            </a:fld>
+            <a:endParaRPr lang="pt-BR"/>
+          </a:p>
+        </p:txBody>
+      </p:sp>
+    </p:spTree>
+  </p:cSld>
+  <p:clrMapOvr>
+    <a:masterClrMapping/>
+  </p:clrMapOvr>
+  <p:timing>
+    <p:tnLst>
+      <p:par>
+        <p:cTn id="1" dur="indefinite" restart="never" nodeType="tmRoot"/>
+      </p:par>
+    </p:tnLst>
+  </p:timing>
+</p:sld>
+</file>
+
+<file path=ppt/slides/slide10.xml><?xml version="1.0" encoding="utf-8"?>
+<p:sld xmlns:a="http://schemas.openxmlformats.org/drawingml/2006/main" xmlns:r="http://schemas.openxmlformats.org/officeDocument/2006/relationships" xmlns:p="http://schemas.openxmlformats.org/presentationml/2006/main">
+  <p:cSld>
+    <p:spTree>
+      <p:nvGrpSpPr>
+        <p:cNvPr id="1" name=""/>
+        <p:cNvGrpSpPr/>
+        <p:nvPr/>
+      </p:nvGrpSpPr>
+      <p:grpSpPr>
+        <a:xfrm>
+          <a:off x="0" y="0"/>
+          <a:ext cx="0" cy="0"/>
+          <a:chOff x="0" y="0"/>
+          <a:chExt cx="0" cy="0"/>
+        </a:xfrm>
+      </p:grpSpPr>
+      <p:sp>
+        <p:nvSpPr>
+          <p:cNvPr id="2" name="Título 1"/>
+          <p:cNvSpPr>
+            <a:spLocks noGrp="1"/>
+          </p:cNvSpPr>
+          <p:nvPr>
+            <p:ph type="title"/>
+          </p:nvPr>
+        </p:nvSpPr>
+        <p:spPr/>
+        <p:txBody>
+          <a:bodyPr/>
+          <a:lstStyle/>
+          <a:p>
+            <a:r>
+              <a:rPr lang="pt-BR" altLang="en-US"/>
+              <a:t>Esquematico Sleep Mode	</a:t>
+            </a:r>
+          </a:p>
+        </p:txBody>
+      </p:sp>
+      <p:pic>
+        <p:nvPicPr>
+          <p:cNvPr id="4" name="Espaço Reservado para Conteúdo 3" descr="SleepMode_LED_Fritzing_Esquemático"/>
+          <p:cNvPicPr>
+            <a:picLocks noGrp="1" noChangeAspect="1"/>
+          </p:cNvPicPr>
+          <p:nvPr>
+            <p:ph idx="1"/>
+          </p:nvPr>
+        </p:nvPicPr>
+        <p:blipFill>
+          <a:blip r:embed="rId2"/>
+          <a:stretch>
+            <a:fillRect/>
+          </a:stretch>
+        </p:blipFill>
+        <p:spPr>
+          <a:xfrm>
+            <a:off x="1052830" y="1691005"/>
+            <a:ext cx="8964295" cy="4558030"/>
+          </a:xfrm>
+          <a:prstGeom prst="rect">
+            <a:avLst/>
+          </a:prstGeom>
+        </p:spPr>
+      </p:pic>
+      <p:sp>
+        <p:nvSpPr>
+          <p:cNvPr id="3" name="Espaço Reservado para Número de Slide 2"/>
+          <p:cNvSpPr>
+            <a:spLocks noGrp="1"/>
+          </p:cNvSpPr>
+          <p:nvPr>
+            <p:ph type="sldNum" sz="quarter" idx="12"/>
+          </p:nvPr>
+        </p:nvSpPr>
+        <p:spPr/>
+        <p:txBody>
+          <a:bodyPr/>
+          <a:lstStyle/>
+          <a:p>
+            <a:fld id="{E3682030-28A4-485C-A222-4952DDFF562A}" type="slidenum">
+              <a:rPr lang="pt-BR" smtClean="0"/>
+              <a:t>10</a:t>
             </a:fld>
             <a:endParaRPr lang="pt-BR"/>
           </a:p>
@@ -3103,7 +3253,14 @@
         <p:cNvGrpSpPr/>
         <p:nvPr/>
       </p:nvGrpSpPr>
-      <p:grpSpPr/>
+      <p:grpSpPr>
+        <a:xfrm>
+          <a:off x="0" y="0"/>
+          <a:ext cx="0" cy="0"/>
+          <a:chOff x="0" y="0"/>
+          <a:chExt cx="0" cy="0"/>
+        </a:xfrm>
+      </p:grpSpPr>
       <p:sp>
         <p:nvSpPr>
           <p:cNvPr id="2" name="Título 1"/>
@@ -3117,12 +3274,12 @@
         <p:spPr/>
         <p:txBody>
           <a:bodyPr/>
+          <a:lstStyle/>
           <a:p>
             <a:r>
               <a:rPr lang="pt-BR" altLang="en-US"/>
               <a:t>Sleep Mode</a:t>
             </a:r>
-            <a:endParaRPr lang="pt-BR" altLang="en-US"/>
           </a:p>
         </p:txBody>
       </p:sp>
@@ -3139,13 +3296,13 @@
         <p:spPr/>
         <p:txBody>
           <a:bodyPr/>
+          <a:lstStyle/>
           <a:p>
             <a:pPr algn="just"/>
             <a:r>
               <a:rPr lang="pt-BR" altLang="en-US"/>
               <a:t>Podemos utilizar a instrução SLEEP para reduzir fortemente o consumo de energia por uma determinada aplicação. Os dispositivos AVR podem ser colocados em diferentes modos de sleep, neste caso o dispositivo AVR que estamos trabalhando é ATMega8</a:t>
             </a:r>
-            <a:endParaRPr lang="pt-BR" altLang="en-US"/>
           </a:p>
         </p:txBody>
       </p:sp>
@@ -3162,9 +3319,11 @@
         <p:spPr/>
         <p:txBody>
           <a:bodyPr/>
+          <a:lstStyle/>
           <a:p>
             <a:fld id="{E3682030-28A4-485C-A222-4952DDFF562A}" type="slidenum">
               <a:rPr lang="pt-BR" smtClean="0"/>
+              <a:t>2</a:t>
             </a:fld>
             <a:endParaRPr lang="pt-BR"/>
           </a:p>
@@ -3175,6 +3334,13 @@
   <p:clrMapOvr>
     <a:masterClrMapping/>
   </p:clrMapOvr>
+  <p:timing>
+    <p:tnLst>
+      <p:par>
+        <p:cTn id="1" dur="indefinite" restart="never" nodeType="tmRoot"/>
+      </p:par>
+    </p:tnLst>
+  </p:timing>
 </p:sld>
 </file>
 
@@ -3187,7 +3353,14 @@
         <p:cNvGrpSpPr/>
         <p:nvPr/>
       </p:nvGrpSpPr>
-      <p:grpSpPr/>
+      <p:grpSpPr>
+        <a:xfrm>
+          <a:off x="0" y="0"/>
+          <a:ext cx="0" cy="0"/>
+          <a:chOff x="0" y="0"/>
+          <a:chExt cx="0" cy="0"/>
+        </a:xfrm>
+      </p:grpSpPr>
       <p:sp>
         <p:nvSpPr>
           <p:cNvPr id="2" name="Título 1"/>
@@ -3201,12 +3374,12 @@
         <p:spPr/>
         <p:txBody>
           <a:bodyPr/>
+          <a:lstStyle/>
           <a:p>
             <a:r>
               <a:rPr lang="pt-BR" altLang="en-US"/>
               <a:t>Sleep Mode</a:t>
             </a:r>
-            <a:endParaRPr lang="pt-BR" altLang="en-US"/>
           </a:p>
         </p:txBody>
       </p:sp>
@@ -3223,15 +3396,86 @@
         <p:spPr/>
         <p:txBody>
           <a:bodyPr>
-            <a:normAutofit lnSpcReduction="20000"/>
+            <a:normAutofit/>
           </a:bodyPr>
+          <a:lstStyle/>
           <a:p>
             <a:pPr algn="just"/>
             <a:r>
-              <a:rPr lang="pt-BR" altLang="en-US"/>
-              <a:t>A biblioteca sleep.h possui diferentes macros para colocar o dispositivo em modo de suspensão. A forma mais simples é opcionalmente configurando o modo de suspensão desejado utilizando a função: set_sleep_mode(); (O padrão é o modo ocioso onde que CPU é coloca no modo de suspensão, mas todos os relógios e periféricos ainda estão em execução) e em seguida devemos ativar o modo de sleep usando a função: sleep_mode().</a:t>
-            </a:r>
-            <a:endParaRPr lang="pt-BR" altLang="en-US"/>
+              <a:rPr lang="pt-BR" altLang="en-US" dirty="0"/>
+              <a:t>A biblioteca </a:t>
+            </a:r>
+            <a:r>
+              <a:rPr lang="pt-BR" altLang="en-US" dirty="0" err="1"/>
+              <a:t>sleep.h</a:t>
+            </a:r>
+            <a:r>
+              <a:rPr lang="pt-BR" altLang="en-US" dirty="0"/>
+              <a:t> possui diferentes macros para colocar o dispositivo em modo de suspensão. A forma mais simples é opcionalmente configurando o modo de suspensão desejado utilizando a função</a:t>
+            </a:r>
+            <a:r>
+              <a:rPr lang="pt-BR" altLang="en-US" dirty="0" smtClean="0"/>
+              <a:t>:</a:t>
+            </a:r>
+          </a:p>
+          <a:p>
+            <a:pPr algn="just"/>
+            <a:r>
+              <a:rPr lang="pt-BR" altLang="en-US" dirty="0" smtClean="0"/>
+              <a:t> </a:t>
+            </a:r>
+            <a:r>
+              <a:rPr lang="pt-BR" altLang="en-US" b="1" dirty="0" err="1"/>
+              <a:t>set_sleep_mode</a:t>
+            </a:r>
+            <a:r>
+              <a:rPr lang="pt-BR" altLang="en-US" dirty="0" smtClean="0"/>
+              <a:t>(): O </a:t>
+            </a:r>
+            <a:r>
+              <a:rPr lang="pt-BR" altLang="en-US" dirty="0"/>
+              <a:t>padrão é o modo </a:t>
+            </a:r>
+            <a:r>
+              <a:rPr lang="pt-BR" altLang="en-US" dirty="0" smtClean="0"/>
+              <a:t>ocioso (</a:t>
+            </a:r>
+            <a:r>
+              <a:rPr lang="pt-BR" altLang="en-US" dirty="0" err="1" smtClean="0"/>
+              <a:t>Mode</a:t>
+            </a:r>
+            <a:r>
+              <a:rPr lang="pt-BR" altLang="en-US" dirty="0" smtClean="0"/>
+              <a:t> </a:t>
+            </a:r>
+            <a:r>
+              <a:rPr lang="pt-BR" altLang="en-US" dirty="0" err="1" smtClean="0"/>
+              <a:t>Idle</a:t>
+            </a:r>
+            <a:r>
+              <a:rPr lang="pt-BR" altLang="en-US" dirty="0" smtClean="0"/>
+              <a:t>) </a:t>
+            </a:r>
+            <a:r>
+              <a:rPr lang="pt-BR" altLang="en-US" dirty="0"/>
+              <a:t>onde que CPU é coloca no modo de suspensão, mas todos os relógios e periféricos ainda estão em </a:t>
+            </a:r>
+            <a:r>
+              <a:rPr lang="pt-BR" altLang="en-US" dirty="0" smtClean="0"/>
+              <a:t>execução.</a:t>
+            </a:r>
+          </a:p>
+          <a:p>
+            <a:pPr algn="just"/>
+            <a:r>
+              <a:rPr lang="pt-BR" altLang="en-US" b="1" dirty="0" err="1"/>
+              <a:t>sleep_mode</a:t>
+            </a:r>
+            <a:r>
+              <a:rPr lang="pt-BR" altLang="en-US" dirty="0" smtClean="0"/>
+              <a:t>(): Ativamos o modo de suspensão.</a:t>
+            </a:r>
+            <a:endParaRPr lang="pt-BR" altLang="en-US" dirty="0"/>
           </a:p>
         </p:txBody>
       </p:sp>
@@ -3248,9 +3492,11 @@
         <p:spPr/>
         <p:txBody>
           <a:bodyPr/>
+          <a:lstStyle/>
           <a:p>
             <a:fld id="{E3682030-28A4-485C-A222-4952DDFF562A}" type="slidenum">
               <a:rPr lang="pt-BR" smtClean="0"/>
+              <a:t>3</a:t>
             </a:fld>
             <a:endParaRPr lang="pt-BR"/>
           </a:p>
@@ -3261,6 +3507,13 @@
   <p:clrMapOvr>
     <a:masterClrMapping/>
   </p:clrMapOvr>
+  <p:timing>
+    <p:tnLst>
+      <p:par>
+        <p:cTn id="1" dur="indefinite" restart="never" nodeType="tmRoot"/>
+      </p:par>
+    </p:tnLst>
+  </p:timing>
 </p:sld>
 </file>
 
@@ -3273,7 +3526,14 @@
         <p:cNvGrpSpPr/>
         <p:nvPr/>
       </p:nvGrpSpPr>
-      <p:grpSpPr/>
+      <p:grpSpPr>
+        <a:xfrm>
+          <a:off x="0" y="0"/>
+          <a:ext cx="0" cy="0"/>
+          <a:chOff x="0" y="0"/>
+          <a:chExt cx="0" cy="0"/>
+        </a:xfrm>
+      </p:grpSpPr>
       <p:sp>
         <p:nvSpPr>
           <p:cNvPr id="2" name="Título 1"/>
@@ -3289,14 +3549,27 @@
           <a:bodyPr>
             <a:normAutofit/>
           </a:bodyPr>
-          <a:p>
-            <a:r>
-              <a:rPr lang="pt-BR" altLang="en-US">
+          <a:lstStyle/>
+          <a:p>
+            <a:r>
+              <a:rPr lang="pt-BR" altLang="en-US" dirty="0" err="1">
                 <a:sym typeface="+mn-ea"/>
               </a:rPr>
-              <a:t>Sleep Mode</a:t>
-            </a:r>
-            <a:endParaRPr lang="pt-BR" altLang="en-US"/>
+              <a:t>Sleep</a:t>
+            </a:r>
+            <a:r>
+              <a:rPr lang="pt-BR" altLang="en-US" dirty="0">
+                <a:sym typeface="+mn-ea"/>
+              </a:rPr>
+              <a:t> </a:t>
+            </a:r>
+            <a:r>
+              <a:rPr lang="pt-BR" altLang="en-US" dirty="0" err="1">
+                <a:sym typeface="+mn-ea"/>
+              </a:rPr>
+              <a:t>Mode</a:t>
+            </a:r>
+            <a:endParaRPr lang="pt-BR" altLang="en-US" dirty="0"/>
           </a:p>
         </p:txBody>
       </p:sp>
@@ -3313,65 +3586,113 @@
         <p:spPr/>
         <p:txBody>
           <a:bodyPr>
-            <a:normAutofit lnSpcReduction="20000"/>
+            <a:normAutofit fontScale="92500" lnSpcReduction="20000"/>
           </a:bodyPr>
+          <a:lstStyle/>
           <a:p>
             <a:pPr marL="0" indent="0">
               <a:buNone/>
             </a:pPr>
             <a:r>
-              <a:rPr lang="pt-BR" altLang="en-US"/>
+              <a:rPr lang="pt-BR" altLang="en-US" dirty="0"/>
               <a:t>Registradores usados:</a:t>
             </a:r>
-            <a:endParaRPr lang="pt-BR" altLang="en-US"/>
           </a:p>
           <a:p>
             <a:pPr marL="0" indent="0">
               <a:buNone/>
             </a:pPr>
-            <a:endParaRPr lang="pt-BR" altLang="en-US"/>
+            <a:endParaRPr lang="pt-BR" altLang="en-US" dirty="0"/>
           </a:p>
           <a:p>
             <a:pPr marL="0" indent="0" algn="just">
               <a:buClrTx/>
             </a:pPr>
             <a:r>
-              <a:rPr lang="pt-BR" altLang="en-US">
+              <a:rPr lang="pt-BR" altLang="en-US" dirty="0">
                 <a:sym typeface="+mn-ea"/>
               </a:rPr>
-              <a:t> OCR1A: É um registrador de saída que pode ser usado para gerar uma interrupção após determinados ciclos de clock. Ele é permanentemente comparado ao TCNT1. Quando ambos coincidem, a interrupção de comparação é acionada.</a:t>
-            </a:r>
-            <a:endParaRPr lang="pt-BR" altLang="en-US"/>
+              <a:t> OCR1A: É um registrador de saída que pode ser usado para gerar uma interrupção após determinados ciclos de </a:t>
+            </a:r>
+            <a:r>
+              <a:rPr lang="pt-BR" altLang="en-US" dirty="0" err="1">
+                <a:sym typeface="+mn-ea"/>
+              </a:rPr>
+              <a:t>clock</a:t>
+            </a:r>
+            <a:r>
+              <a:rPr lang="pt-BR" altLang="en-US" dirty="0">
+                <a:sym typeface="+mn-ea"/>
+              </a:rPr>
+              <a:t>. Ele é permanentemente comparado ao TCNT1. Quando ambos coincidem, a interrupção de comparação é acionada.</a:t>
+            </a:r>
+            <a:endParaRPr lang="pt-BR" altLang="en-US" dirty="0"/>
           </a:p>
           <a:p>
             <a:pPr marL="0" indent="0" algn="just">
               <a:buClrTx/>
             </a:pPr>
             <a:r>
-              <a:rPr lang="pt-BR" altLang="en-US">
+              <a:rPr lang="pt-BR" altLang="en-US" dirty="0">
                 <a:sym typeface="+mn-ea"/>
               </a:rPr>
-              <a:t> TCNT: É o registrador mais importante, pois ele é um registrador de tempo base para todos os outros registradores do microcontrolador. Ele pode realizar contagem de tempo do clock do sistema, ente outras contagens conforme a necessidade do desenvolvedor.</a:t>
-            </a:r>
-            <a:endParaRPr lang="pt-BR" altLang="en-US"/>
+              <a:t> TCNT: É o registrador mais importante, pois ele é um registrador de tempo base para todos os outros registradores do </a:t>
+            </a:r>
+            <a:r>
+              <a:rPr lang="pt-BR" altLang="en-US" dirty="0" err="1">
+                <a:sym typeface="+mn-ea"/>
+              </a:rPr>
+              <a:t>microcontrolador</a:t>
+            </a:r>
+            <a:r>
+              <a:rPr lang="pt-BR" altLang="en-US" dirty="0">
+                <a:sym typeface="+mn-ea"/>
+              </a:rPr>
+              <a:t>. Ele pode realizar contagem de tempo do </a:t>
+            </a:r>
+            <a:r>
+              <a:rPr lang="pt-BR" altLang="en-US" dirty="0" err="1">
+                <a:sym typeface="+mn-ea"/>
+              </a:rPr>
+              <a:t>clock</a:t>
+            </a:r>
+            <a:r>
+              <a:rPr lang="pt-BR" altLang="en-US" dirty="0">
+                <a:sym typeface="+mn-ea"/>
+              </a:rPr>
+              <a:t> do sistema, ente outras contagens conforme a necessidade do desenvolvedor.</a:t>
+            </a:r>
+            <a:endParaRPr lang="pt-BR" altLang="en-US" dirty="0"/>
           </a:p>
           <a:p>
             <a:pPr marL="0" indent="0" algn="just">
               <a:buClrTx/>
             </a:pPr>
             <a:r>
-              <a:rPr lang="pt-BR" altLang="en-US">
+              <a:rPr lang="pt-BR" altLang="en-US" dirty="0">
                 <a:sym typeface="+mn-ea"/>
               </a:rPr>
-              <a:t> TCCR : é um registrado utilizado para definir o modo temporizador, o pré-escalador e outras opções.</a:t>
-            </a:r>
-            <a:endParaRPr lang="pt-BR" altLang="en-US"/>
+              <a:t> TCCR : é um registrado utilizado para definir o modo temporizador, o </a:t>
+            </a:r>
+            <a:r>
+              <a:rPr lang="pt-BR" altLang="en-US" dirty="0" err="1">
+                <a:sym typeface="+mn-ea"/>
+              </a:rPr>
+              <a:t>pré</a:t>
+            </a:r>
+            <a:r>
+              <a:rPr lang="pt-BR" altLang="en-US" dirty="0">
+                <a:sym typeface="+mn-ea"/>
+              </a:rPr>
+              <a:t>-escalador e outras opções.</a:t>
+            </a:r>
+            <a:endParaRPr lang="pt-BR" altLang="en-US" dirty="0"/>
           </a:p>
           <a:p>
             <a:pPr marL="0" indent="0">
               <a:buNone/>
             </a:pPr>
-            <a:endParaRPr lang="pt-BR" altLang="en-US"/>
+            <a:endParaRPr lang="pt-BR" altLang="en-US" dirty="0"/>
           </a:p>
         </p:txBody>
       </p:sp>
@@ -3388,9 +3709,11 @@
         <p:spPr/>
         <p:txBody>
           <a:bodyPr/>
+          <a:lstStyle/>
           <a:p>
             <a:fld id="{E3682030-28A4-485C-A222-4952DDFF562A}" type="slidenum">
               <a:rPr lang="pt-BR" smtClean="0"/>
+              <a:t>4</a:t>
             </a:fld>
             <a:endParaRPr lang="pt-BR"/>
           </a:p>
@@ -3401,6 +3724,13 @@
   <p:clrMapOvr>
     <a:masterClrMapping/>
   </p:clrMapOvr>
+  <p:timing>
+    <p:tnLst>
+      <p:par>
+        <p:cTn id="1" dur="indefinite" restart="never" nodeType="tmRoot"/>
+      </p:par>
+    </p:tnLst>
+  </p:timing>
 </p:sld>
 </file>
 
@@ -3413,7 +3743,14 @@
         <p:cNvGrpSpPr/>
         <p:nvPr/>
       </p:nvGrpSpPr>
-      <p:grpSpPr/>
+      <p:grpSpPr>
+        <a:xfrm>
+          <a:off x="0" y="0"/>
+          <a:ext cx="0" cy="0"/>
+          <a:chOff x="0" y="0"/>
+          <a:chExt cx="0" cy="0"/>
+        </a:xfrm>
+      </p:grpSpPr>
       <p:sp>
         <p:nvSpPr>
           <p:cNvPr id="2" name="Título 1"/>
@@ -3427,12 +3764,712 @@
         <p:spPr/>
         <p:txBody>
           <a:bodyPr/>
+          <a:lstStyle/>
+          <a:p>
+            <a:r>
+              <a:rPr lang="pt-BR" dirty="0" smtClean="0"/>
+              <a:t>Implementação</a:t>
+            </a:r>
+            <a:endParaRPr lang="pt-BR" dirty="0"/>
+          </a:p>
+        </p:txBody>
+      </p:sp>
+      <p:sp>
+        <p:nvSpPr>
+          <p:cNvPr id="4" name="Espaço Reservado para Número de Slide 3"/>
+          <p:cNvSpPr>
+            <a:spLocks noGrp="1"/>
+          </p:cNvSpPr>
+          <p:nvPr>
+            <p:ph type="sldNum" sz="quarter" idx="12"/>
+          </p:nvPr>
+        </p:nvSpPr>
+        <p:spPr/>
+        <p:txBody>
+          <a:bodyPr/>
+          <a:lstStyle/>
+          <a:p>
+            <a:fld id="{E3682030-28A4-485C-A222-4952DDFF562A}" type="slidenum">
+              <a:rPr lang="pt-BR" smtClean="0"/>
+              <a:t>5</a:t>
+            </a:fld>
+            <a:endParaRPr lang="pt-BR"/>
+          </a:p>
+        </p:txBody>
+      </p:sp>
+      <p:sp>
+        <p:nvSpPr>
+          <p:cNvPr id="8" name="CaixaDeTexto 7"/>
+          <p:cNvSpPr txBox="1"/>
+          <p:nvPr/>
+        </p:nvSpPr>
+        <p:spPr>
+          <a:xfrm>
+            <a:off x="6627253" y="1690688"/>
+            <a:ext cx="3966693" cy="1200329"/>
+          </a:xfrm>
+          <a:prstGeom prst="rect">
+            <a:avLst/>
+          </a:prstGeom>
+          <a:noFill/>
+        </p:spPr>
+        <p:txBody>
+          <a:bodyPr wrap="square" rtlCol="0">
+            <a:spAutoFit/>
+          </a:bodyPr>
+          <a:lstStyle/>
+          <a:p>
+            <a:r>
+              <a:rPr lang="pt-BR" dirty="0" smtClean="0"/>
+              <a:t>Inicialmente definimos o PORTB como saída, pois será utilizado para ligar o LED.</a:t>
+            </a:r>
+          </a:p>
+          <a:p>
+            <a:endParaRPr lang="pt-BR" dirty="0"/>
+          </a:p>
+        </p:txBody>
+      </p:sp>
+      <p:pic>
+        <p:nvPicPr>
+          <p:cNvPr id="13" name="Espaço Reservado para Conteúdo 12"/>
+          <p:cNvPicPr>
+            <a:picLocks noGrp="1" noChangeAspect="1"/>
+          </p:cNvPicPr>
+          <p:nvPr>
+            <p:ph idx="1"/>
+          </p:nvPr>
+        </p:nvPicPr>
+        <p:blipFill>
+          <a:blip r:embed="rId2"/>
+          <a:stretch>
+            <a:fillRect/>
+          </a:stretch>
+        </p:blipFill>
+        <p:spPr>
+          <a:xfrm>
+            <a:off x="838200" y="1690688"/>
+            <a:ext cx="4618896" cy="4351338"/>
+          </a:xfrm>
+          <a:prstGeom prst="rect">
+            <a:avLst/>
+          </a:prstGeom>
+        </p:spPr>
+      </p:pic>
+    </p:spTree>
+    <p:extLst>
+      <p:ext uri="{BB962C8B-B14F-4D97-AF65-F5344CB8AC3E}">
+        <p14:creationId xmlns:p14="http://schemas.microsoft.com/office/powerpoint/2010/main" val="299658685"/>
+      </p:ext>
+    </p:extLst>
+  </p:cSld>
+  <p:clrMapOvr>
+    <a:masterClrMapping/>
+  </p:clrMapOvr>
+  <p:timing>
+    <p:tnLst>
+      <p:par>
+        <p:cTn id="1" dur="indefinite" restart="never" nodeType="tmRoot"/>
+      </p:par>
+    </p:tnLst>
+  </p:timing>
+</p:sld>
+</file>
+
+<file path=ppt/slides/slide6.xml><?xml version="1.0" encoding="utf-8"?>
+<p:sld xmlns:a="http://schemas.openxmlformats.org/drawingml/2006/main" xmlns:r="http://schemas.openxmlformats.org/officeDocument/2006/relationships" xmlns:p="http://schemas.openxmlformats.org/presentationml/2006/main">
+  <p:cSld>
+    <p:spTree>
+      <p:nvGrpSpPr>
+        <p:cNvPr id="1" name=""/>
+        <p:cNvGrpSpPr/>
+        <p:nvPr/>
+      </p:nvGrpSpPr>
+      <p:grpSpPr>
+        <a:xfrm>
+          <a:off x="0" y="0"/>
+          <a:ext cx="0" cy="0"/>
+          <a:chOff x="0" y="0"/>
+          <a:chExt cx="0" cy="0"/>
+        </a:xfrm>
+      </p:grpSpPr>
+      <p:sp>
+        <p:nvSpPr>
+          <p:cNvPr id="2" name="Título 1"/>
+          <p:cNvSpPr>
+            <a:spLocks noGrp="1"/>
+          </p:cNvSpPr>
+          <p:nvPr>
+            <p:ph type="title"/>
+          </p:nvPr>
+        </p:nvSpPr>
+        <p:spPr/>
+        <p:txBody>
+          <a:bodyPr/>
+          <a:lstStyle/>
+          <a:p>
+            <a:r>
+              <a:rPr lang="pt-BR" dirty="0"/>
+              <a:t>Implementação</a:t>
+            </a:r>
+          </a:p>
+        </p:txBody>
+      </p:sp>
+      <p:sp>
+        <p:nvSpPr>
+          <p:cNvPr id="4" name="Espaço Reservado para Número de Slide 3"/>
+          <p:cNvSpPr>
+            <a:spLocks noGrp="1"/>
+          </p:cNvSpPr>
+          <p:nvPr>
+            <p:ph type="sldNum" sz="quarter" idx="12"/>
+          </p:nvPr>
+        </p:nvSpPr>
+        <p:spPr/>
+        <p:txBody>
+          <a:bodyPr/>
+          <a:lstStyle/>
+          <a:p>
+            <a:fld id="{E3682030-28A4-485C-A222-4952DDFF562A}" type="slidenum">
+              <a:rPr lang="pt-BR" smtClean="0"/>
+              <a:t>6</a:t>
+            </a:fld>
+            <a:endParaRPr lang="pt-BR"/>
+          </a:p>
+        </p:txBody>
+      </p:sp>
+      <p:pic>
+        <p:nvPicPr>
+          <p:cNvPr id="7" name="Espaço Reservado para Conteúdo 6"/>
+          <p:cNvPicPr>
+            <a:picLocks noGrp="1" noChangeAspect="1"/>
+          </p:cNvPicPr>
+          <p:nvPr>
+            <p:ph idx="1"/>
+          </p:nvPr>
+        </p:nvPicPr>
+        <p:blipFill>
+          <a:blip r:embed="rId2"/>
+          <a:stretch>
+            <a:fillRect/>
+          </a:stretch>
+        </p:blipFill>
+        <p:spPr>
+          <a:xfrm>
+            <a:off x="838200" y="1847850"/>
+            <a:ext cx="4884992" cy="4351338"/>
+          </a:xfrm>
+          <a:prstGeom prst="rect">
+            <a:avLst/>
+          </a:prstGeom>
+        </p:spPr>
+      </p:pic>
+      <p:sp>
+        <p:nvSpPr>
+          <p:cNvPr id="8" name="CaixaDeTexto 7"/>
+          <p:cNvSpPr txBox="1"/>
+          <p:nvPr/>
+        </p:nvSpPr>
+        <p:spPr>
+          <a:xfrm>
+            <a:off x="6272011" y="1847850"/>
+            <a:ext cx="5653826" cy="3416320"/>
+          </a:xfrm>
+          <a:prstGeom prst="rect">
+            <a:avLst/>
+          </a:prstGeom>
+          <a:noFill/>
+        </p:spPr>
+        <p:txBody>
+          <a:bodyPr wrap="square" rtlCol="0">
+            <a:spAutoFit/>
+          </a:bodyPr>
+          <a:lstStyle/>
+          <a:p>
+            <a:pPr marL="285750" indent="-285750">
+              <a:buFont typeface="Arial" panose="020B0604020202020204" pitchFamily="34" charset="0"/>
+              <a:buChar char="•"/>
+            </a:pPr>
+            <a:r>
+              <a:rPr lang="pt-BR" dirty="0" smtClean="0"/>
+              <a:t>i = Recebe um valor pela serial que irá definir quantos segundos o LED ficará desligado.</a:t>
+            </a:r>
+          </a:p>
+          <a:p>
+            <a:pPr marL="285750" indent="-285750">
+              <a:buFont typeface="Arial" panose="020B0604020202020204" pitchFamily="34" charset="0"/>
+              <a:buChar char="•"/>
+            </a:pPr>
+            <a:endParaRPr lang="pt-BR" dirty="0" smtClean="0"/>
+          </a:p>
+          <a:p>
+            <a:pPr marL="285750" indent="-285750">
+              <a:buFont typeface="Arial" panose="020B0604020202020204" pitchFamily="34" charset="0"/>
+              <a:buChar char="•"/>
+            </a:pPr>
+            <a:r>
+              <a:rPr lang="pt-BR" dirty="0" smtClean="0"/>
+              <a:t>OCR1A = Irá gerar uma interrupção a cada 1 segundo (=~ 975 </a:t>
+            </a:r>
+            <a:r>
+              <a:rPr lang="pt-BR" dirty="0" err="1" smtClean="0"/>
+              <a:t>ms</a:t>
+            </a:r>
+            <a:r>
+              <a:rPr lang="pt-BR" dirty="0" smtClean="0"/>
+              <a:t>).</a:t>
+            </a:r>
+          </a:p>
+          <a:p>
+            <a:pPr marL="285750" indent="-285750">
+              <a:buFont typeface="Arial" panose="020B0604020202020204" pitchFamily="34" charset="0"/>
+              <a:buChar char="•"/>
+            </a:pPr>
+            <a:r>
+              <a:rPr lang="pt-BR" dirty="0" smtClean="0"/>
+              <a:t>TCCR1B = Realiza é um registrador de tempo que ficara trabalhando comparando com o OCR1A.</a:t>
+            </a:r>
+          </a:p>
+          <a:p>
+            <a:pPr marL="285750" indent="-285750">
+              <a:buFont typeface="Arial" panose="020B0604020202020204" pitchFamily="34" charset="0"/>
+              <a:buChar char="•"/>
+            </a:pPr>
+            <a:endParaRPr lang="pt-BR" dirty="0"/>
+          </a:p>
+          <a:p>
+            <a:pPr marL="285750" indent="-285750">
+              <a:buFont typeface="Arial" panose="020B0604020202020204" pitchFamily="34" charset="0"/>
+              <a:buChar char="•"/>
+            </a:pPr>
+            <a:r>
+              <a:rPr lang="pt-BR" dirty="0" smtClean="0"/>
+              <a:t>TIMSK = Compara os tempos de OCR1A e TCR1B ao coincidir irá gerar uma interrupção chamando a rotina ISR (Próximo Slide veremos ISR).</a:t>
+            </a:r>
+          </a:p>
+          <a:p>
+            <a:pPr marL="285750" indent="-285750">
+              <a:buFont typeface="Arial" panose="020B0604020202020204" pitchFamily="34" charset="0"/>
+              <a:buChar char="•"/>
+            </a:pPr>
+            <a:endParaRPr lang="pt-BR" dirty="0"/>
+          </a:p>
+        </p:txBody>
+      </p:sp>
+    </p:spTree>
+    <p:extLst>
+      <p:ext uri="{BB962C8B-B14F-4D97-AF65-F5344CB8AC3E}">
+        <p14:creationId xmlns:p14="http://schemas.microsoft.com/office/powerpoint/2010/main" val="1067098738"/>
+      </p:ext>
+    </p:extLst>
+  </p:cSld>
+  <p:clrMapOvr>
+    <a:masterClrMapping/>
+  </p:clrMapOvr>
+</p:sld>
+</file>
+
+<file path=ppt/slides/slide7.xml><?xml version="1.0" encoding="utf-8"?>
+<p:sld xmlns:a="http://schemas.openxmlformats.org/drawingml/2006/main" xmlns:r="http://schemas.openxmlformats.org/officeDocument/2006/relationships" xmlns:p="http://schemas.openxmlformats.org/presentationml/2006/main">
+  <p:cSld>
+    <p:spTree>
+      <p:nvGrpSpPr>
+        <p:cNvPr id="1" name=""/>
+        <p:cNvGrpSpPr/>
+        <p:nvPr/>
+      </p:nvGrpSpPr>
+      <p:grpSpPr>
+        <a:xfrm>
+          <a:off x="0" y="0"/>
+          <a:ext cx="0" cy="0"/>
+          <a:chOff x="0" y="0"/>
+          <a:chExt cx="0" cy="0"/>
+        </a:xfrm>
+      </p:grpSpPr>
+      <p:sp>
+        <p:nvSpPr>
+          <p:cNvPr id="2" name="Título 1"/>
+          <p:cNvSpPr>
+            <a:spLocks noGrp="1"/>
+          </p:cNvSpPr>
+          <p:nvPr>
+            <p:ph type="title"/>
+          </p:nvPr>
+        </p:nvSpPr>
+        <p:spPr/>
+        <p:txBody>
+          <a:bodyPr/>
+          <a:lstStyle/>
+          <a:p>
+            <a:r>
+              <a:rPr lang="pt-BR" dirty="0"/>
+              <a:t>Implementação</a:t>
+            </a:r>
+          </a:p>
+        </p:txBody>
+      </p:sp>
+      <p:pic>
+        <p:nvPicPr>
+          <p:cNvPr id="5" name="Espaço Reservado para Conteúdo 4"/>
+          <p:cNvPicPr>
+            <a:picLocks noGrp="1" noChangeAspect="1"/>
+          </p:cNvPicPr>
+          <p:nvPr>
+            <p:ph idx="1"/>
+          </p:nvPr>
+        </p:nvPicPr>
+        <p:blipFill>
+          <a:blip r:embed="rId2"/>
+          <a:stretch>
+            <a:fillRect/>
+          </a:stretch>
+        </p:blipFill>
+        <p:spPr>
+          <a:xfrm>
+            <a:off x="838200" y="1467062"/>
+            <a:ext cx="3324225" cy="1857375"/>
+          </a:xfrm>
+          <a:prstGeom prst="rect">
+            <a:avLst/>
+          </a:prstGeom>
+        </p:spPr>
+      </p:pic>
+      <p:sp>
+        <p:nvSpPr>
+          <p:cNvPr id="4" name="Espaço Reservado para Número de Slide 3"/>
+          <p:cNvSpPr>
+            <a:spLocks noGrp="1"/>
+          </p:cNvSpPr>
+          <p:nvPr>
+            <p:ph type="sldNum" sz="quarter" idx="12"/>
+          </p:nvPr>
+        </p:nvSpPr>
+        <p:spPr/>
+        <p:txBody>
+          <a:bodyPr/>
+          <a:lstStyle/>
+          <a:p>
+            <a:fld id="{E3682030-28A4-485C-A222-4952DDFF562A}" type="slidenum">
+              <a:rPr lang="pt-BR" smtClean="0"/>
+              <a:t>7</a:t>
+            </a:fld>
+            <a:endParaRPr lang="pt-BR"/>
+          </a:p>
+        </p:txBody>
+      </p:sp>
+      <p:sp>
+        <p:nvSpPr>
+          <p:cNvPr id="7" name="CaixaDeTexto 6"/>
+          <p:cNvSpPr txBox="1"/>
+          <p:nvPr/>
+        </p:nvSpPr>
+        <p:spPr>
+          <a:xfrm>
+            <a:off x="5138669" y="1571223"/>
+            <a:ext cx="4868215" cy="2308324"/>
+          </a:xfrm>
+          <a:prstGeom prst="rect">
+            <a:avLst/>
+          </a:prstGeom>
+          <a:noFill/>
+        </p:spPr>
+        <p:txBody>
+          <a:bodyPr wrap="square" rtlCol="0">
+            <a:spAutoFit/>
+          </a:bodyPr>
+          <a:lstStyle/>
+          <a:p>
+            <a:pPr marL="285750" indent="-285750">
+              <a:buFont typeface="Arial" panose="020B0604020202020204" pitchFamily="34" charset="0"/>
+              <a:buChar char="•"/>
+            </a:pPr>
+            <a:r>
+              <a:rPr lang="pt-BR" dirty="0" smtClean="0"/>
+              <a:t>As interrupções são geradas a cada 1 segundo;</a:t>
+            </a:r>
+          </a:p>
+          <a:p>
+            <a:pPr marL="285750" indent="-285750">
+              <a:buFont typeface="Arial" panose="020B0604020202020204" pitchFamily="34" charset="0"/>
+              <a:buChar char="•"/>
+            </a:pPr>
+            <a:r>
+              <a:rPr lang="pt-BR" dirty="0" smtClean="0"/>
+              <a:t>A cada interrupção ISR é invocada;</a:t>
+            </a:r>
+          </a:p>
+          <a:p>
+            <a:pPr marL="285750" indent="-285750">
+              <a:buFont typeface="Arial" panose="020B0604020202020204" pitchFamily="34" charset="0"/>
+              <a:buChar char="•"/>
+            </a:pPr>
+            <a:r>
+              <a:rPr lang="pt-BR" dirty="0" smtClean="0"/>
+              <a:t>A cada invocação de ISR é decrementado;</a:t>
+            </a:r>
+          </a:p>
+          <a:p>
+            <a:pPr marL="285750" indent="-285750">
+              <a:buFont typeface="Arial" panose="020B0604020202020204" pitchFamily="34" charset="0"/>
+              <a:buChar char="•"/>
+            </a:pPr>
+            <a:r>
+              <a:rPr lang="pt-BR" dirty="0" smtClean="0"/>
+              <a:t>Quando I chega a 0 o modo de suspensão é desativado;</a:t>
+            </a:r>
+          </a:p>
+          <a:p>
+            <a:pPr marL="285750" indent="-285750">
+              <a:buFont typeface="Arial" panose="020B0604020202020204" pitchFamily="34" charset="0"/>
+              <a:buChar char="•"/>
+            </a:pPr>
+            <a:r>
+              <a:rPr lang="pt-BR" dirty="0" smtClean="0"/>
+              <a:t>As interrupções são ativadas;</a:t>
+            </a:r>
+          </a:p>
+          <a:p>
+            <a:pPr marL="285750" indent="-285750">
+              <a:buFont typeface="Arial" panose="020B0604020202020204" pitchFamily="34" charset="0"/>
+              <a:buChar char="•"/>
+            </a:pPr>
+            <a:r>
+              <a:rPr lang="pt-BR" dirty="0" smtClean="0"/>
+              <a:t>O LED é ligado novamente;</a:t>
+            </a:r>
+          </a:p>
+          <a:p>
+            <a:pPr marL="285750" indent="-285750">
+              <a:buFont typeface="Arial" panose="020B0604020202020204" pitchFamily="34" charset="0"/>
+              <a:buChar char="•"/>
+            </a:pPr>
+            <a:endParaRPr lang="pt-BR" dirty="0"/>
+          </a:p>
+        </p:txBody>
+      </p:sp>
+    </p:spTree>
+    <p:extLst>
+      <p:ext uri="{BB962C8B-B14F-4D97-AF65-F5344CB8AC3E}">
+        <p14:creationId xmlns:p14="http://schemas.microsoft.com/office/powerpoint/2010/main" val="4014557250"/>
+      </p:ext>
+    </p:extLst>
+  </p:cSld>
+  <p:clrMapOvr>
+    <a:masterClrMapping/>
+  </p:clrMapOvr>
+</p:sld>
+</file>
+
+<file path=ppt/slides/slide8.xml><?xml version="1.0" encoding="utf-8"?>
+<p:sld xmlns:a="http://schemas.openxmlformats.org/drawingml/2006/main" xmlns:r="http://schemas.openxmlformats.org/officeDocument/2006/relationships" xmlns:p="http://schemas.openxmlformats.org/presentationml/2006/main">
+  <p:cSld>
+    <p:spTree>
+      <p:nvGrpSpPr>
+        <p:cNvPr id="1" name=""/>
+        <p:cNvGrpSpPr/>
+        <p:nvPr/>
+      </p:nvGrpSpPr>
+      <p:grpSpPr>
+        <a:xfrm>
+          <a:off x="0" y="0"/>
+          <a:ext cx="0" cy="0"/>
+          <a:chOff x="0" y="0"/>
+          <a:chExt cx="0" cy="0"/>
+        </a:xfrm>
+      </p:grpSpPr>
+      <p:sp>
+        <p:nvSpPr>
+          <p:cNvPr id="2" name="Título 1"/>
+          <p:cNvSpPr>
+            <a:spLocks noGrp="1"/>
+          </p:cNvSpPr>
+          <p:nvPr>
+            <p:ph type="title"/>
+          </p:nvPr>
+        </p:nvSpPr>
+        <p:spPr/>
+        <p:txBody>
+          <a:bodyPr/>
+          <a:lstStyle/>
+          <a:p>
+            <a:endParaRPr lang="pt-BR"/>
+          </a:p>
+        </p:txBody>
+      </p:sp>
+      <p:pic>
+        <p:nvPicPr>
+          <p:cNvPr id="5" name="Espaço Reservado para Conteúdo 4"/>
+          <p:cNvPicPr>
+            <a:picLocks noGrp="1" noChangeAspect="1"/>
+          </p:cNvPicPr>
+          <p:nvPr>
+            <p:ph idx="1"/>
+          </p:nvPr>
+        </p:nvPicPr>
+        <p:blipFill>
+          <a:blip r:embed="rId2"/>
+          <a:stretch>
+            <a:fillRect/>
+          </a:stretch>
+        </p:blipFill>
+        <p:spPr>
+          <a:xfrm>
+            <a:off x="838200" y="1847850"/>
+            <a:ext cx="5371924" cy="4351338"/>
+          </a:xfrm>
+          <a:prstGeom prst="rect">
+            <a:avLst/>
+          </a:prstGeom>
+        </p:spPr>
+      </p:pic>
+      <p:sp>
+        <p:nvSpPr>
+          <p:cNvPr id="4" name="Espaço Reservado para Número de Slide 3"/>
+          <p:cNvSpPr>
+            <a:spLocks noGrp="1"/>
+          </p:cNvSpPr>
+          <p:nvPr>
+            <p:ph type="sldNum" sz="quarter" idx="12"/>
+          </p:nvPr>
+        </p:nvSpPr>
+        <p:spPr/>
+        <p:txBody>
+          <a:bodyPr/>
+          <a:lstStyle/>
+          <a:p>
+            <a:fld id="{E3682030-28A4-485C-A222-4952DDFF562A}" type="slidenum">
+              <a:rPr lang="pt-BR" smtClean="0"/>
+              <a:t>8</a:t>
+            </a:fld>
+            <a:endParaRPr lang="pt-BR"/>
+          </a:p>
+        </p:txBody>
+      </p:sp>
+      <p:sp>
+        <p:nvSpPr>
+          <p:cNvPr id="6" name="CaixaDeTexto 5"/>
+          <p:cNvSpPr txBox="1"/>
+          <p:nvPr/>
+        </p:nvSpPr>
+        <p:spPr>
+          <a:xfrm>
+            <a:off x="6645499" y="1944710"/>
+            <a:ext cx="3992450" cy="2862322"/>
+          </a:xfrm>
+          <a:prstGeom prst="rect">
+            <a:avLst/>
+          </a:prstGeom>
+          <a:noFill/>
+        </p:spPr>
+        <p:txBody>
+          <a:bodyPr wrap="square" rtlCol="0">
+            <a:spAutoFit/>
+          </a:bodyPr>
+          <a:lstStyle/>
+          <a:p>
+            <a:pPr marL="285750" indent="-285750">
+              <a:buFont typeface="Arial" panose="020B0604020202020204" pitchFamily="34" charset="0"/>
+              <a:buChar char="•"/>
+            </a:pPr>
+            <a:r>
+              <a:rPr lang="pt-BR" dirty="0" smtClean="0"/>
+              <a:t>O </a:t>
+            </a:r>
+            <a:r>
+              <a:rPr lang="pt-BR" dirty="0" err="1" smtClean="0"/>
+              <a:t>delay</a:t>
+            </a:r>
+            <a:r>
+              <a:rPr lang="pt-BR" dirty="0" smtClean="0"/>
+              <a:t> de 2 segundos é usado inicialmente para desligar o LED e ativar o modo </a:t>
+            </a:r>
+            <a:r>
+              <a:rPr lang="pt-BR" dirty="0" err="1" smtClean="0"/>
+              <a:t>sleep</a:t>
+            </a:r>
+            <a:r>
+              <a:rPr lang="pt-BR" dirty="0" smtClean="0"/>
+              <a:t>;</a:t>
+            </a:r>
+          </a:p>
+          <a:p>
+            <a:pPr marL="285750" indent="-285750">
+              <a:buFont typeface="Arial" panose="020B0604020202020204" pitchFamily="34" charset="0"/>
+              <a:buChar char="•"/>
+            </a:pPr>
+            <a:endParaRPr lang="pt-BR" dirty="0"/>
+          </a:p>
+          <a:p>
+            <a:pPr marL="285750" indent="-285750">
+              <a:buFont typeface="Arial" panose="020B0604020202020204" pitchFamily="34" charset="0"/>
+              <a:buChar char="•"/>
+            </a:pPr>
+            <a:r>
+              <a:rPr lang="pt-BR" dirty="0" smtClean="0"/>
+              <a:t>sei() é usado para ativar as interrupções;</a:t>
+            </a:r>
+          </a:p>
+          <a:p>
+            <a:pPr marL="285750" indent="-285750">
+              <a:buFont typeface="Arial" panose="020B0604020202020204" pitchFamily="34" charset="0"/>
+              <a:buChar char="•"/>
+            </a:pPr>
+            <a:r>
+              <a:rPr lang="pt-BR" dirty="0" smtClean="0"/>
+              <a:t>SLEEP_MODE_IDLE:  A CPU é colocada para dormir porem os relógios e periféricos continuam funcionando.</a:t>
+            </a:r>
+            <a:endParaRPr lang="pt-BR" dirty="0"/>
+          </a:p>
+        </p:txBody>
+      </p:sp>
+    </p:spTree>
+    <p:extLst>
+      <p:ext uri="{BB962C8B-B14F-4D97-AF65-F5344CB8AC3E}">
+        <p14:creationId xmlns:p14="http://schemas.microsoft.com/office/powerpoint/2010/main" val="4269578247"/>
+      </p:ext>
+    </p:extLst>
+  </p:cSld>
+  <p:clrMapOvr>
+    <a:masterClrMapping/>
+  </p:clrMapOvr>
+</p:sld>
+</file>
+
+<file path=ppt/slides/slide9.xml><?xml version="1.0" encoding="utf-8"?>
+<p:sld xmlns:a="http://schemas.openxmlformats.org/drawingml/2006/main" xmlns:r="http://schemas.openxmlformats.org/officeDocument/2006/relationships" xmlns:p="http://schemas.openxmlformats.org/presentationml/2006/main">
+  <p:cSld>
+    <p:spTree>
+      <p:nvGrpSpPr>
+        <p:cNvPr id="1" name=""/>
+        <p:cNvGrpSpPr/>
+        <p:nvPr/>
+      </p:nvGrpSpPr>
+      <p:grpSpPr>
+        <a:xfrm>
+          <a:off x="0" y="0"/>
+          <a:ext cx="0" cy="0"/>
+          <a:chOff x="0" y="0"/>
+          <a:chExt cx="0" cy="0"/>
+        </a:xfrm>
+      </p:grpSpPr>
+      <p:sp>
+        <p:nvSpPr>
+          <p:cNvPr id="2" name="Título 1"/>
+          <p:cNvSpPr>
+            <a:spLocks noGrp="1"/>
+          </p:cNvSpPr>
+          <p:nvPr>
+            <p:ph type="title"/>
+          </p:nvPr>
+        </p:nvSpPr>
+        <p:spPr/>
+        <p:txBody>
+          <a:bodyPr/>
+          <a:lstStyle/>
           <a:p>
             <a:r>
               <a:rPr lang="pt-BR" altLang="en-US"/>
               <a:t>Montagem na protoboard</a:t>
             </a:r>
-            <a:endParaRPr lang="pt-BR" altLang="en-US"/>
           </a:p>
         </p:txBody>
       </p:sp>
@@ -3440,14 +4477,14 @@
         <p:nvPicPr>
           <p:cNvPr id="4" name="Espaço Reservado para Conteúdo 3" descr="SleepMode_LED_Fritzing_bb"/>
           <p:cNvPicPr>
-            <a:picLocks noChangeAspect="1"/>
+            <a:picLocks noGrp="1" noChangeAspect="1"/>
           </p:cNvPicPr>
           <p:nvPr>
             <p:ph idx="1"/>
           </p:nvPr>
         </p:nvPicPr>
         <p:blipFill>
-          <a:blip r:embed="rId1"/>
+          <a:blip r:embed="rId2"/>
           <a:stretch>
             <a:fillRect/>
           </a:stretch>
@@ -3475,9 +4512,11 @@
         <p:spPr/>
         <p:txBody>
           <a:bodyPr/>
+          <a:lstStyle/>
           <a:p>
             <a:fld id="{E3682030-28A4-485C-A222-4952DDFF562A}" type="slidenum">
               <a:rPr lang="pt-BR" smtClean="0"/>
+              <a:t>9</a:t>
             </a:fld>
             <a:endParaRPr lang="pt-BR"/>
           </a:p>
@@ -3488,93 +4527,13 @@
   <p:clrMapOvr>
     <a:masterClrMapping/>
   </p:clrMapOvr>
-</p:sld>
-</file>
-
-<file path=ppt/slides/slide6.xml><?xml version="1.0" encoding="utf-8"?>
-<p:sld xmlns:a="http://schemas.openxmlformats.org/drawingml/2006/main" xmlns:r="http://schemas.openxmlformats.org/officeDocument/2006/relationships" xmlns:p="http://schemas.openxmlformats.org/presentationml/2006/main">
-  <p:cSld>
-    <p:spTree>
-      <p:nvGrpSpPr>
-        <p:cNvPr id="1" name=""/>
-        <p:cNvGrpSpPr/>
-        <p:nvPr/>
-      </p:nvGrpSpPr>
-      <p:grpSpPr/>
-      <p:sp>
-        <p:nvSpPr>
-          <p:cNvPr id="2" name="Título 1"/>
-          <p:cNvSpPr>
-            <a:spLocks noGrp="1"/>
-          </p:cNvSpPr>
-          <p:nvPr>
-            <p:ph type="title"/>
-          </p:nvPr>
-        </p:nvSpPr>
-        <p:spPr/>
-        <p:txBody>
-          <a:bodyPr/>
-          <a:p>
-            <a:r>
-              <a:rPr lang="pt-BR" altLang="en-US"/>
-              <a:t>Esquematico Sleep Mode	</a:t>
-            </a:r>
-            <a:endParaRPr lang="pt-BR" altLang="en-US"/>
-          </a:p>
-        </p:txBody>
-      </p:sp>
-      <p:pic>
-        <p:nvPicPr>
-          <p:cNvPr id="4" name="Espaço Reservado para Conteúdo 3" descr="SleepMode_LED_Fritzing_Esquemático"/>
-          <p:cNvPicPr>
-            <a:picLocks noChangeAspect="1"/>
-          </p:cNvPicPr>
-          <p:nvPr>
-            <p:ph idx="1"/>
-          </p:nvPr>
-        </p:nvPicPr>
-        <p:blipFill>
-          <a:blip r:embed="rId1"/>
-          <a:stretch>
-            <a:fillRect/>
-          </a:stretch>
-        </p:blipFill>
-        <p:spPr>
-          <a:xfrm>
-            <a:off x="1052830" y="1691005"/>
-            <a:ext cx="8964295" cy="4558030"/>
-          </a:xfrm>
-          <a:prstGeom prst="rect">
-            <a:avLst/>
-          </a:prstGeom>
-        </p:spPr>
-      </p:pic>
-      <p:sp>
-        <p:nvSpPr>
-          <p:cNvPr id="3" name="Espaço Reservado para Número de Slide 2"/>
-          <p:cNvSpPr>
-            <a:spLocks noGrp="1"/>
-          </p:cNvSpPr>
-          <p:nvPr>
-            <p:ph type="sldNum" sz="quarter" idx="12"/>
-          </p:nvPr>
-        </p:nvSpPr>
-        <p:spPr/>
-        <p:txBody>
-          <a:bodyPr/>
-          <a:p>
-            <a:fld id="{E3682030-28A4-485C-A222-4952DDFF562A}" type="slidenum">
-              <a:rPr lang="pt-BR" smtClean="0"/>
-            </a:fld>
-            <a:endParaRPr lang="pt-BR"/>
-          </a:p>
-        </p:txBody>
-      </p:sp>
-    </p:spTree>
-  </p:cSld>
-  <p:clrMapOvr>
-    <a:masterClrMapping/>
-  </p:clrMapOvr>
+  <p:timing>
+    <p:tnLst>
+      <p:par>
+        <p:cTn id="1" dur="indefinite" restart="never" nodeType="tmRoot"/>
+      </p:par>
+    </p:tnLst>
+  </p:timing>
 </p:sld>
 </file>
 
@@ -3829,6 +4788,8 @@
       </a:bgFillStyleLst>
     </a:fmtScheme>
   </a:themeElements>
+  <a:objectDefaults/>
+  <a:extraClrSchemeLst/>
   <a:extLst>
     <a:ext uri="{05A4C25C-085E-4340-85A3-A5531E510DB2}">
       <thm15:themeFamily xmlns:thm15="http://schemas.microsoft.com/office/thememl/2012/main" name="Office Theme" id="{62F939B6-93AF-4DB8-9C6B-D6C7DFDC589F}" vid="{4A3C46E8-61CC-4603-A589-7422A47A8E4A}"/>
@@ -4088,6 +5049,8 @@
       </a:bgFillStyleLst>
     </a:fmtScheme>
   </a:themeElements>
+  <a:objectDefaults/>
+  <a:extraClrSchemeLst/>
   <a:extLst>
     <a:ext uri="{05A4C25C-085E-4340-85A3-A5531E510DB2}">
       <thm15:themeFamily xmlns:thm15="http://schemas.microsoft.com/office/thememl/2012/main" name="Office Theme" id="{62F939B6-93AF-4DB8-9C6B-D6C7DFDC589F}" vid="{4A3C46E8-61CC-4603-A589-7422A47A8E4A}"/>

</xml_diff>